<commit_message>
halfway done presentation, 5 min runtime
</commit_message>
<xml_diff>
--- a/Documents/Final Presentation/Final incomplete.pptx
+++ b/Documents/Final Presentation/Final incomplete.pptx
@@ -5,14 +5,14 @@
     <p:sldMasterId id="2147483659" r:id="rId1"/>
   </p:sldMasterIdLst>
   <p:notesMasterIdLst>
-    <p:notesMasterId r:id="rId26"/>
+    <p:notesMasterId r:id="rId28"/>
   </p:notesMasterIdLst>
   <p:sldIdLst>
     <p:sldId id="256" r:id="rId2"/>
     <p:sldId id="265" r:id="rId3"/>
     <p:sldId id="257" r:id="rId4"/>
-    <p:sldId id="258" r:id="rId5"/>
-    <p:sldId id="259" r:id="rId6"/>
+    <p:sldId id="259" r:id="rId5"/>
+    <p:sldId id="258" r:id="rId6"/>
     <p:sldId id="260" r:id="rId7"/>
     <p:sldId id="261" r:id="rId8"/>
     <p:sldId id="263" r:id="rId9"/>
@@ -32,6 +32,8 @@
     <p:sldId id="268" r:id="rId23"/>
     <p:sldId id="269" r:id="rId24"/>
     <p:sldId id="270" r:id="rId25"/>
+    <p:sldId id="280" r:id="rId26"/>
+    <p:sldId id="281" r:id="rId27"/>
   </p:sldIdLst>
   <p:sldSz cx="9144000" cy="5143500" type="screen16x9"/>
   <p:notesSz cx="6858000" cy="9144000"/>
@@ -829,6 +831,72 @@
 </file>
 
 <file path=ppt/notesSlides/notesSlide2.xml><?xml version="1.0" encoding="utf-8"?>
+<p:notes xmlns:a="http://schemas.openxmlformats.org/drawingml/2006/main" xmlns:r="http://schemas.openxmlformats.org/officeDocument/2006/relationships" xmlns:p="http://schemas.openxmlformats.org/presentationml/2006/main">
+  <p:cSld>
+    <p:spTree>
+      <p:nvGrpSpPr>
+        <p:cNvPr id="1" name=""/>
+        <p:cNvGrpSpPr/>
+        <p:nvPr/>
+      </p:nvGrpSpPr>
+      <p:grpSpPr>
+        <a:xfrm>
+          <a:off x="0" y="0"/>
+          <a:ext cx="0" cy="0"/>
+          <a:chOff x="0" y="0"/>
+          <a:chExt cx="0" cy="0"/>
+        </a:xfrm>
+      </p:grpSpPr>
+      <p:sp>
+        <p:nvSpPr>
+          <p:cNvPr id="2" name="Slide Image Placeholder 1"/>
+          <p:cNvSpPr>
+            <a:spLocks noGrp="1" noRot="1" noChangeAspect="1"/>
+          </p:cNvSpPr>
+          <p:nvPr>
+            <p:ph type="sldImg"/>
+          </p:nvPr>
+        </p:nvSpPr>
+        <p:spPr>
+          <a:xfrm>
+            <a:off x="381000" y="685800"/>
+            <a:ext cx="6096000" cy="3429000"/>
+          </a:xfrm>
+        </p:spPr>
+      </p:sp>
+      <p:sp>
+        <p:nvSpPr>
+          <p:cNvPr id="3" name="Notes Placeholder 2"/>
+          <p:cNvSpPr>
+            <a:spLocks noGrp="1"/>
+          </p:cNvSpPr>
+          <p:nvPr>
+            <p:ph type="body" idx="1"/>
+          </p:nvPr>
+        </p:nvSpPr>
+        <p:spPr/>
+        <p:txBody>
+          <a:bodyPr/>
+          <a:lstStyle/>
+          <a:p>
+            <a:endParaRPr lang="en-CA" dirty="0"/>
+          </a:p>
+        </p:txBody>
+      </p:sp>
+    </p:spTree>
+    <p:extLst>
+      <p:ext uri="{BB962C8B-B14F-4D97-AF65-F5344CB8AC3E}">
+        <p14:creationId xmlns:p14="http://schemas.microsoft.com/office/powerpoint/2010/main" val="2779053025"/>
+      </p:ext>
+    </p:extLst>
+  </p:cSld>
+  <p:clrMapOvr>
+    <a:masterClrMapping/>
+  </p:clrMapOvr>
+</p:notes>
+</file>
+
+<file path=ppt/notesSlides/notesSlide3.xml><?xml version="1.0" encoding="utf-8"?>
 <p:notes xmlns:a="http://schemas.openxmlformats.org/drawingml/2006/main" xmlns:r="http://schemas.openxmlformats.org/officeDocument/2006/relationships" xmlns:p="http://schemas.openxmlformats.org/presentationml/2006/main" showMasterSp="0" showMasterPhAnim="0">
   <p:cSld>
     <p:spTree>
@@ -889,110 +957,6 @@
       <p:sp>
         <p:nvSpPr>
           <p:cNvPr id="58" name="Google Shape;58;g78d170854d_0_0:notes"/>
-          <p:cNvSpPr txBox="1">
-            <a:spLocks noGrp="1"/>
-          </p:cNvSpPr>
-          <p:nvPr>
-            <p:ph type="body" idx="1"/>
-          </p:nvPr>
-        </p:nvSpPr>
-        <p:spPr>
-          <a:xfrm>
-            <a:off x="685800" y="4343400"/>
-            <a:ext cx="5486400" cy="4114800"/>
-          </a:xfrm>
-          <a:prstGeom prst="rect">
-            <a:avLst/>
-          </a:prstGeom>
-        </p:spPr>
-        <p:txBody>
-          <a:bodyPr spcFirstLastPara="1" wrap="square" lIns="91425" tIns="91425" rIns="91425" bIns="91425" anchor="t" anchorCtr="0">
-            <a:noAutofit/>
-          </a:bodyPr>
-          <a:lstStyle/>
-          <a:p>
-            <a:pPr marL="0" lvl="0" indent="0" algn="l" rtl="0">
-              <a:spcBef>
-                <a:spcPts val="0"/>
-              </a:spcBef>
-              <a:spcAft>
-                <a:spcPts val="0"/>
-              </a:spcAft>
-              <a:buNone/>
-            </a:pPr>
-            <a:endParaRPr/>
-          </a:p>
-        </p:txBody>
-      </p:sp>
-    </p:spTree>
-  </p:cSld>
-  <p:clrMapOvr>
-    <a:masterClrMapping/>
-  </p:clrMapOvr>
-</p:notes>
-</file>
-
-<file path=ppt/notesSlides/notesSlide3.xml><?xml version="1.0" encoding="utf-8"?>
-<p:notes xmlns:a="http://schemas.openxmlformats.org/drawingml/2006/main" xmlns:r="http://schemas.openxmlformats.org/officeDocument/2006/relationships" xmlns:p="http://schemas.openxmlformats.org/presentationml/2006/main" showMasterSp="0" showMasterPhAnim="0">
-  <p:cSld>
-    <p:spTree>
-      <p:nvGrpSpPr>
-        <p:cNvPr id="1" name="Shape 62"/>
-        <p:cNvGrpSpPr/>
-        <p:nvPr/>
-      </p:nvGrpSpPr>
-      <p:grpSpPr>
-        <a:xfrm>
-          <a:off x="0" y="0"/>
-          <a:ext cx="0" cy="0"/>
-          <a:chOff x="0" y="0"/>
-          <a:chExt cx="0" cy="0"/>
-        </a:xfrm>
-      </p:grpSpPr>
-      <p:sp>
-        <p:nvSpPr>
-          <p:cNvPr id="63" name="Google Shape;63;g78d170854d_0_5:notes"/>
-          <p:cNvSpPr>
-            <a:spLocks noGrp="1" noRot="1" noChangeAspect="1"/>
-          </p:cNvSpPr>
-          <p:nvPr>
-            <p:ph type="sldImg" idx="2"/>
-          </p:nvPr>
-        </p:nvSpPr>
-        <p:spPr>
-          <a:xfrm>
-            <a:off x="381000" y="685800"/>
-            <a:ext cx="6096000" cy="3429000"/>
-          </a:xfrm>
-          <a:custGeom>
-            <a:avLst/>
-            <a:gdLst/>
-            <a:ahLst/>
-            <a:cxnLst/>
-            <a:rect l="l" t="t" r="r" b="b"/>
-            <a:pathLst>
-              <a:path w="120000" h="120000" extrusionOk="0">
-                <a:moveTo>
-                  <a:pt x="0" y="0"/>
-                </a:moveTo>
-                <a:lnTo>
-                  <a:pt x="120000" y="0"/>
-                </a:lnTo>
-                <a:lnTo>
-                  <a:pt x="120000" y="120000"/>
-                </a:lnTo>
-                <a:lnTo>
-                  <a:pt x="0" y="120000"/>
-                </a:lnTo>
-                <a:close/>
-              </a:path>
-            </a:pathLst>
-          </a:custGeom>
-        </p:spPr>
-      </p:sp>
-      <p:sp>
-        <p:nvSpPr>
-          <p:cNvPr id="64" name="Google Shape;64;g78d170854d_0_5:notes"/>
           <p:cNvSpPr txBox="1">
             <a:spLocks noGrp="1"/>
           </p:cNvSpPr>
@@ -1145,7 +1109,7 @@
   <p:cSld>
     <p:spTree>
       <p:nvGrpSpPr>
-        <p:cNvPr id="1" name="Shape 74"/>
+        <p:cNvPr id="1" name="Shape 62"/>
         <p:cNvGrpSpPr/>
         <p:nvPr/>
       </p:nvGrpSpPr>
@@ -1159,7 +1123,7 @@
       </p:grpSpPr>
       <p:sp>
         <p:nvSpPr>
-          <p:cNvPr id="75" name="Google Shape;75;g78d170854d_0_15:notes"/>
+          <p:cNvPr id="63" name="Google Shape;63;g78d170854d_0_5:notes"/>
           <p:cNvSpPr>
             <a:spLocks noGrp="1" noRot="1" noChangeAspect="1"/>
           </p:cNvSpPr>
@@ -1200,7 +1164,7 @@
       </p:sp>
       <p:sp>
         <p:nvSpPr>
-          <p:cNvPr id="76" name="Google Shape;76;g78d170854d_0_15:notes"/>
+          <p:cNvPr id="64" name="Google Shape;64;g78d170854d_0_5:notes"/>
           <p:cNvSpPr txBox="1">
             <a:spLocks noGrp="1"/>
           </p:cNvSpPr>
@@ -1245,6 +1209,110 @@
 </file>
 
 <file path=ppt/notesSlides/notesSlide6.xml><?xml version="1.0" encoding="utf-8"?>
+<p:notes xmlns:a="http://schemas.openxmlformats.org/drawingml/2006/main" xmlns:r="http://schemas.openxmlformats.org/officeDocument/2006/relationships" xmlns:p="http://schemas.openxmlformats.org/presentationml/2006/main" showMasterSp="0" showMasterPhAnim="0">
+  <p:cSld>
+    <p:spTree>
+      <p:nvGrpSpPr>
+        <p:cNvPr id="1" name="Shape 74"/>
+        <p:cNvGrpSpPr/>
+        <p:nvPr/>
+      </p:nvGrpSpPr>
+      <p:grpSpPr>
+        <a:xfrm>
+          <a:off x="0" y="0"/>
+          <a:ext cx="0" cy="0"/>
+          <a:chOff x="0" y="0"/>
+          <a:chExt cx="0" cy="0"/>
+        </a:xfrm>
+      </p:grpSpPr>
+      <p:sp>
+        <p:nvSpPr>
+          <p:cNvPr id="75" name="Google Shape;75;g78d170854d_0_15:notes"/>
+          <p:cNvSpPr>
+            <a:spLocks noGrp="1" noRot="1" noChangeAspect="1"/>
+          </p:cNvSpPr>
+          <p:nvPr>
+            <p:ph type="sldImg" idx="2"/>
+          </p:nvPr>
+        </p:nvSpPr>
+        <p:spPr>
+          <a:xfrm>
+            <a:off x="381000" y="685800"/>
+            <a:ext cx="6096000" cy="3429000"/>
+          </a:xfrm>
+          <a:custGeom>
+            <a:avLst/>
+            <a:gdLst/>
+            <a:ahLst/>
+            <a:cxnLst/>
+            <a:rect l="l" t="t" r="r" b="b"/>
+            <a:pathLst>
+              <a:path w="120000" h="120000" extrusionOk="0">
+                <a:moveTo>
+                  <a:pt x="0" y="0"/>
+                </a:moveTo>
+                <a:lnTo>
+                  <a:pt x="120000" y="0"/>
+                </a:lnTo>
+                <a:lnTo>
+                  <a:pt x="120000" y="120000"/>
+                </a:lnTo>
+                <a:lnTo>
+                  <a:pt x="0" y="120000"/>
+                </a:lnTo>
+                <a:close/>
+              </a:path>
+            </a:pathLst>
+          </a:custGeom>
+        </p:spPr>
+      </p:sp>
+      <p:sp>
+        <p:nvSpPr>
+          <p:cNvPr id="76" name="Google Shape;76;g78d170854d_0_15:notes"/>
+          <p:cNvSpPr txBox="1">
+            <a:spLocks noGrp="1"/>
+          </p:cNvSpPr>
+          <p:nvPr>
+            <p:ph type="body" idx="1"/>
+          </p:nvPr>
+        </p:nvSpPr>
+        <p:spPr>
+          <a:xfrm>
+            <a:off x="685800" y="4343400"/>
+            <a:ext cx="5486400" cy="4114800"/>
+          </a:xfrm>
+          <a:prstGeom prst="rect">
+            <a:avLst/>
+          </a:prstGeom>
+        </p:spPr>
+        <p:txBody>
+          <a:bodyPr spcFirstLastPara="1" wrap="square" lIns="91425" tIns="91425" rIns="91425" bIns="91425" anchor="t" anchorCtr="0">
+            <a:noAutofit/>
+          </a:bodyPr>
+          <a:lstStyle/>
+          <a:p>
+            <a:pPr marL="0" lvl="0" indent="0" algn="l" rtl="0">
+              <a:spcBef>
+                <a:spcPts val="0"/>
+              </a:spcBef>
+              <a:spcAft>
+                <a:spcPts val="0"/>
+              </a:spcAft>
+              <a:buNone/>
+            </a:pPr>
+            <a:endParaRPr/>
+          </a:p>
+        </p:txBody>
+      </p:sp>
+    </p:spTree>
+  </p:cSld>
+  <p:clrMapOvr>
+    <a:masterClrMapping/>
+  </p:clrMapOvr>
+</p:notes>
+</file>
+
+<file path=ppt/notesSlides/notesSlide7.xml><?xml version="1.0" encoding="utf-8"?>
 <p:notes xmlns:a="http://schemas.openxmlformats.org/drawingml/2006/main" xmlns:r="http://schemas.openxmlformats.org/officeDocument/2006/relationships" xmlns:p="http://schemas.openxmlformats.org/presentationml/2006/main">
   <p:cSld>
     <p:spTree>
@@ -1271,7 +1339,12 @@
             <p:ph type="sldImg"/>
           </p:nvPr>
         </p:nvSpPr>
-        <p:spPr/>
+        <p:spPr>
+          <a:xfrm>
+            <a:off x="381000" y="685800"/>
+            <a:ext cx="6096000" cy="3429000"/>
+          </a:xfrm>
+        </p:spPr>
       </p:sp>
       <p:sp>
         <p:nvSpPr>
@@ -2271,7 +2344,7 @@
           <a:p>
             <a:fld id="{A1942545-05D9-4282-A235-BDAF2A598E4D}" type="datetimeFigureOut">
               <a:rPr lang="en-US" smtClean="0"/>
-              <a:t>11/18/19</a:t>
+              <a:t>11/18/2019</a:t>
             </a:fld>
             <a:endParaRPr lang="en-US"/>
           </a:p>
@@ -6534,14 +6607,9 @@
   <p:clrMapOvr>
     <a:masterClrMapping/>
   </p:clrMapOvr>
-  <mc:AlternateContent xmlns:mc="http://schemas.openxmlformats.org/markup-compatibility/2006" xmlns:p14="http://schemas.microsoft.com/office/powerpoint/2010/main">
-    <mc:Choice Requires="p14">
-      <p:transition spd="slow" p14:dur="2000" advTm="4000"/>
-    </mc:Choice>
-    <mc:Fallback xmlns="">
-      <p:transition spd="slow" advTm="4000"/>
-    </mc:Fallback>
-  </mc:AlternateContent>
+  <p:transition spd="slow" advTm="5000">
+    <p:push dir="u"/>
+  </p:transition>
 </p:sld>
 </file>
 
@@ -6725,14 +6793,9 @@
   <p:clrMapOvr>
     <a:masterClrMapping/>
   </p:clrMapOvr>
-  <mc:AlternateContent xmlns:mc="http://schemas.openxmlformats.org/markup-compatibility/2006" xmlns:p14="http://schemas.microsoft.com/office/powerpoint/2010/main">
-    <mc:Choice Requires="p14">
-      <p:transition spd="slow" p14:dur="2000" advTm="17000"/>
-    </mc:Choice>
-    <mc:Fallback xmlns="">
-      <p:transition spd="slow" advTm="17000"/>
-    </mc:Fallback>
-  </mc:AlternateContent>
+  <p:transition spd="slow" advTm="15000">
+    <p:push dir="u"/>
+  </p:transition>
 </p:sld>
 </file>
 
@@ -6816,14 +6879,9 @@
   <p:clrMapOvr>
     <a:masterClrMapping/>
   </p:clrMapOvr>
-  <mc:AlternateContent xmlns:mc="http://schemas.openxmlformats.org/markup-compatibility/2006" xmlns:p14="http://schemas.microsoft.com/office/powerpoint/2010/main">
-    <mc:Choice Requires="p14">
-      <p:transition spd="slow" p14:dur="2000" advTm="4000"/>
-    </mc:Choice>
-    <mc:Fallback xmlns="">
-      <p:transition spd="slow" advTm="4000"/>
-    </mc:Fallback>
-  </mc:AlternateContent>
+  <p:transition spd="slow" advTm="5000">
+    <p:push dir="u"/>
+  </p:transition>
 </p:sld>
 </file>
 
@@ -6976,14 +7034,9 @@
   <p:clrMapOvr>
     <a:masterClrMapping/>
   </p:clrMapOvr>
-  <mc:AlternateContent xmlns:mc="http://schemas.openxmlformats.org/markup-compatibility/2006" xmlns:p14="http://schemas.microsoft.com/office/powerpoint/2010/main">
-    <mc:Choice Requires="p14">
-      <p:transition spd="slow" p14:dur="2000" advTm="13000"/>
-    </mc:Choice>
-    <mc:Fallback xmlns="">
-      <p:transition spd="slow" advTm="13000"/>
-    </mc:Fallback>
-  </mc:AlternateContent>
+  <p:transition spd="slow" advTm="15000">
+    <p:push dir="u"/>
+  </p:transition>
 </p:sld>
 </file>
 
@@ -7132,14 +7185,9 @@
   <p:clrMapOvr>
     <a:masterClrMapping/>
   </p:clrMapOvr>
-  <mc:AlternateContent xmlns:mc="http://schemas.openxmlformats.org/markup-compatibility/2006" xmlns:p14="http://schemas.microsoft.com/office/powerpoint/2010/main">
-    <mc:Choice Requires="p14">
-      <p:transition spd="slow" p14:dur="2000" advTm="16000"/>
-    </mc:Choice>
-    <mc:Fallback xmlns="">
-      <p:transition spd="slow" advTm="16000"/>
-    </mc:Fallback>
-  </mc:AlternateContent>
+  <p:transition spd="slow" advTm="15000">
+    <p:push dir="u"/>
+  </p:transition>
 </p:sld>
 </file>
 
@@ -7286,14 +7334,9 @@
   <p:clrMapOvr>
     <a:masterClrMapping/>
   </p:clrMapOvr>
-  <mc:AlternateContent xmlns:mc="http://schemas.openxmlformats.org/markup-compatibility/2006" xmlns:p14="http://schemas.microsoft.com/office/powerpoint/2010/main">
-    <mc:Choice Requires="p14">
-      <p:transition spd="slow" p14:dur="2000" advTm="15000"/>
-    </mc:Choice>
-    <mc:Fallback xmlns="">
-      <p:transition spd="slow" advTm="15000"/>
-    </mc:Fallback>
-  </mc:AlternateContent>
+  <p:transition spd="slow" advTm="15000">
+    <p:push dir="u"/>
+  </p:transition>
 </p:sld>
 </file>
 
@@ -7443,14 +7486,9 @@
   <p:clrMapOvr>
     <a:masterClrMapping/>
   </p:clrMapOvr>
-  <mc:AlternateContent xmlns:mc="http://schemas.openxmlformats.org/markup-compatibility/2006" xmlns:p14="http://schemas.microsoft.com/office/powerpoint/2010/main">
-    <mc:Choice Requires="p14">
-      <p:transition spd="slow" p14:dur="2000" advTm="10000"/>
-    </mc:Choice>
-    <mc:Fallback xmlns="">
-      <p:transition spd="slow" advTm="10000"/>
-    </mc:Fallback>
-  </mc:AlternateContent>
+  <p:transition spd="slow" advTm="10000">
+    <p:push dir="u"/>
+  </p:transition>
 </p:sld>
 </file>
 
@@ -7591,14 +7629,9 @@
   <p:clrMapOvr>
     <a:masterClrMapping/>
   </p:clrMapOvr>
-  <mc:AlternateContent xmlns:mc="http://schemas.openxmlformats.org/markup-compatibility/2006" xmlns:p14="http://schemas.microsoft.com/office/powerpoint/2010/main">
-    <mc:Choice Requires="p14">
-      <p:transition spd="slow" p14:dur="2000" advTm="10000"/>
-    </mc:Choice>
-    <mc:Fallback xmlns="">
-      <p:transition spd="slow" advTm="10000"/>
-    </mc:Fallback>
-  </mc:AlternateContent>
+  <p:transition spd="slow" advTm="10000">
+    <p:push dir="u"/>
+  </p:transition>
 </p:sld>
 </file>
 
@@ -7695,14 +7728,9 @@
   <p:clrMapOvr>
     <a:masterClrMapping/>
   </p:clrMapOvr>
-  <mc:AlternateContent xmlns:mc="http://schemas.openxmlformats.org/markup-compatibility/2006" xmlns:p14="http://schemas.microsoft.com/office/powerpoint/2010/main">
-    <mc:Choice Requires="p14">
-      <p:transition spd="slow" p14:dur="2000" advTm="15000"/>
-    </mc:Choice>
-    <mc:Fallback xmlns="">
-      <p:transition spd="slow" advTm="15000"/>
-    </mc:Fallback>
-  </mc:AlternateContent>
+  <p:transition spd="slow" advTm="30000">
+    <p:push dir="u"/>
+  </p:transition>
 </p:sld>
 </file>
 
@@ -7772,7 +7800,12 @@
             <p:ph type="body" idx="1"/>
           </p:nvPr>
         </p:nvSpPr>
-        <p:spPr/>
+        <p:spPr>
+          <a:xfrm>
+            <a:off x="311700" y="1036546"/>
+            <a:ext cx="8520600" cy="3416400"/>
+          </a:xfrm>
+        </p:spPr>
         <p:txBody>
           <a:bodyPr/>
           <a:lstStyle/>
@@ -7785,19 +7818,49 @@
           <a:p>
             <a:r>
               <a:rPr lang="en-CA" sz="2400" dirty="0"/>
-              <a:t>Our Code Design Process</a:t>
+              <a:t>Code Design Process</a:t>
             </a:r>
           </a:p>
           <a:p>
             <a:r>
               <a:rPr lang="en-CA" sz="2400" dirty="0"/>
-              <a:t>How to Install Game</a:t>
+              <a:t>Class Relationships</a:t>
             </a:r>
           </a:p>
           <a:p>
             <a:r>
               <a:rPr lang="en-CA" sz="2400" dirty="0"/>
-              <a:t>Gameplay Rundown</a:t>
+              <a:t>What We have Learned</a:t>
+            </a:r>
+          </a:p>
+          <a:p>
+            <a:r>
+              <a:rPr lang="en-CA" sz="2400" dirty="0"/>
+              <a:t>Milestones</a:t>
+            </a:r>
+          </a:p>
+          <a:p>
+            <a:r>
+              <a:rPr lang="en-CA" sz="2400" dirty="0"/>
+              <a:t>Installation</a:t>
+            </a:r>
+          </a:p>
+          <a:p>
+            <a:r>
+              <a:rPr lang="en-CA" sz="2400" dirty="0"/>
+              <a:t>Gameplay</a:t>
+            </a:r>
+          </a:p>
+          <a:p>
+            <a:r>
+              <a:rPr lang="en-CA" sz="2400" dirty="0"/>
+              <a:t>Conclusion</a:t>
+            </a:r>
+          </a:p>
+          <a:p>
+            <a:r>
+              <a:rPr lang="en-CA" sz="2400" dirty="0"/>
+              <a:t>Call to Action</a:t>
             </a:r>
           </a:p>
           <a:p>
@@ -7806,8 +7869,89 @@
           <a:p>
             <a:endParaRPr lang="en-CA" sz="2400" dirty="0"/>
           </a:p>
-          <a:p>
-            <a:endParaRPr lang="en-CA" sz="2400" dirty="0"/>
+        </p:txBody>
+      </p:sp>
+      <p:pic>
+        <p:nvPicPr>
+          <p:cNvPr id="4" name="Picture 3">
+            <a:extLst>
+              <a:ext uri="{FF2B5EF4-FFF2-40B4-BE49-F238E27FC236}">
+                <a16:creationId xmlns:a16="http://schemas.microsoft.com/office/drawing/2014/main" id="{B11733A5-E3A4-4901-A887-38D07E686CAD}"/>
+              </a:ext>
+            </a:extLst>
+          </p:cNvPr>
+          <p:cNvPicPr>
+            <a:picLocks noChangeAspect="1"/>
+          </p:cNvPicPr>
+          <p:nvPr/>
+        </p:nvPicPr>
+        <p:blipFill>
+          <a:blip r:embed="rId3"/>
+          <a:stretch>
+            <a:fillRect/>
+          </a:stretch>
+        </p:blipFill>
+        <p:spPr>
+          <a:xfrm>
+            <a:off x="4960878" y="1614395"/>
+            <a:ext cx="3475265" cy="2492559"/>
+          </a:xfrm>
+          <a:prstGeom prst="rect">
+            <a:avLst/>
+          </a:prstGeom>
+        </p:spPr>
+      </p:pic>
+      <p:sp>
+        <p:nvSpPr>
+          <p:cNvPr id="5" name="Rectangle 4">
+            <a:extLst>
+              <a:ext uri="{FF2B5EF4-FFF2-40B4-BE49-F238E27FC236}">
+                <a16:creationId xmlns:a16="http://schemas.microsoft.com/office/drawing/2014/main" id="{7DD378B6-AABF-47DB-A537-D9CC056F15D6}"/>
+              </a:ext>
+            </a:extLst>
+          </p:cNvPr>
+          <p:cNvSpPr/>
+          <p:nvPr/>
+        </p:nvSpPr>
+        <p:spPr>
+          <a:xfrm>
+            <a:off x="4960878" y="1614395"/>
+            <a:ext cx="334136" cy="225038"/>
+          </a:xfrm>
+          <a:prstGeom prst="rect">
+            <a:avLst/>
+          </a:prstGeom>
+          <a:solidFill>
+            <a:schemeClr val="bg1"/>
+          </a:solidFill>
+          <a:ln>
+            <a:solidFill>
+              <a:schemeClr val="bg1"/>
+            </a:solidFill>
+          </a:ln>
+        </p:spPr>
+        <p:style>
+          <a:lnRef idx="2">
+            <a:schemeClr val="accent1">
+              <a:shade val="50000"/>
+            </a:schemeClr>
+          </a:lnRef>
+          <a:fillRef idx="1">
+            <a:schemeClr val="accent1"/>
+          </a:fillRef>
+          <a:effectRef idx="0">
+            <a:schemeClr val="accent1"/>
+          </a:effectRef>
+          <a:fontRef idx="minor">
+            <a:schemeClr val="lt1"/>
+          </a:fontRef>
+        </p:style>
+        <p:txBody>
+          <a:bodyPr rtlCol="0" anchor="ctr"/>
+          <a:lstStyle/>
+          <a:p>
+            <a:pPr algn="ctr"/>
+            <a:endParaRPr lang="en-CA"/>
           </a:p>
         </p:txBody>
       </p:sp>
@@ -7821,6 +7965,9 @@
   <p:clrMapOvr>
     <a:masterClrMapping/>
   </p:clrMapOvr>
+  <p:transition spd="slow" advTm="20000">
+    <p:push dir="u"/>
+  </p:transition>
 </p:sld>
 </file>
 
@@ -7885,7 +8032,7 @@
               <a:buClrTx/>
               <a:defRPr/>
             </a:pPr>
-            <a:endParaRPr lang="en-US" sz="1350" kern="1200">
+            <a:endParaRPr lang="en-US" sz="1350" kern="1200" dirty="0">
               <a:solidFill>
                 <a:prstClr val="white"/>
               </a:solidFill>
@@ -8047,7 +8194,7 @@
           <a:p>
             <a:pPr algn="l"/>
             <a:r>
-              <a:rPr lang="en-US" sz="3825">
+              <a:rPr lang="en-US" sz="3825" dirty="0">
                 <a:solidFill>
                   <a:schemeClr val="tx1">
                     <a:lumMod val="85000"/>
@@ -8163,6 +8310,9 @@
   <p:clrMapOvr>
     <a:masterClrMapping/>
   </p:clrMapOvr>
+  <p:transition spd="slow" advTm="5000">
+    <p:push dir="u"/>
+  </p:transition>
 </p:sld>
 </file>
 
@@ -8349,6 +8499,9 @@
   <p:clrMapOvr>
     <a:masterClrMapping/>
   </p:clrMapOvr>
+  <p:transition spd="slow" advTm="10000">
+    <p:push dir="u"/>
+  </p:transition>
 </p:sld>
 </file>
 
@@ -8602,7 +8755,7 @@
         <p:spPr>
           <a:xfrm>
             <a:off x="26671" y="2344103"/>
-            <a:ext cx="3389471" cy="2114074"/>
+            <a:ext cx="3389471" cy="2323590"/>
           </a:xfrm>
           <a:prstGeom prst="rect">
             <a:avLst/>
@@ -8614,6 +8767,9 @@
   <p:clrMapOvr>
     <a:masterClrMapping/>
   </p:clrMapOvr>
+  <p:transition spd="slow" advTm="10000">
+    <p:push dir="u"/>
+  </p:transition>
 </p:sld>
 </file>
 
@@ -8799,6 +8955,9 @@
   <p:clrMapOvr>
     <a:masterClrMapping/>
   </p:clrMapOvr>
+  <p:transition spd="slow" advTm="5000">
+    <p:push dir="u"/>
+  </p:transition>
 </p:sld>
 </file>
 
@@ -8895,7 +9054,7 @@
           <a:p>
             <a:pPr algn="ctr"/>
             <a:r>
-              <a:rPr lang="en-US" sz="2100" b="1"/>
+              <a:rPr lang="en-US" sz="2100" b="1" dirty="0"/>
               <a:t>Strictly follow the milestones.</a:t>
             </a:r>
           </a:p>
@@ -8930,6 +9089,175 @@
   <p:clrMapOvr>
     <a:masterClrMapping/>
   </p:clrMapOvr>
+  <p:transition spd="slow" advTm="10000">
+    <p:push dir="u"/>
+  </p:transition>
+</p:sld>
+</file>
+
+<file path=ppt/slides/slide25.xml><?xml version="1.0" encoding="utf-8"?>
+<p:sld xmlns:a="http://schemas.openxmlformats.org/drawingml/2006/main" xmlns:r="http://schemas.openxmlformats.org/officeDocument/2006/relationships" xmlns:p="http://schemas.openxmlformats.org/presentationml/2006/main">
+  <p:cSld>
+    <p:spTree>
+      <p:nvGrpSpPr>
+        <p:cNvPr id="1" name=""/>
+        <p:cNvGrpSpPr/>
+        <p:nvPr/>
+      </p:nvGrpSpPr>
+      <p:grpSpPr>
+        <a:xfrm>
+          <a:off x="0" y="0"/>
+          <a:ext cx="0" cy="0"/>
+          <a:chOff x="0" y="0"/>
+          <a:chExt cx="0" cy="0"/>
+        </a:xfrm>
+      </p:grpSpPr>
+      <p:sp>
+        <p:nvSpPr>
+          <p:cNvPr id="2" name="Title 1">
+            <a:extLst>
+              <a:ext uri="{FF2B5EF4-FFF2-40B4-BE49-F238E27FC236}">
+                <a16:creationId xmlns:a16="http://schemas.microsoft.com/office/drawing/2014/main" id="{9CE22C77-C3BA-47A9-B4EF-17646E7F1F48}"/>
+              </a:ext>
+            </a:extLst>
+          </p:cNvPr>
+          <p:cNvSpPr>
+            <a:spLocks noGrp="1"/>
+          </p:cNvSpPr>
+          <p:nvPr>
+            <p:ph type="title"/>
+          </p:nvPr>
+        </p:nvSpPr>
+        <p:spPr>
+          <a:xfrm>
+            <a:off x="2798040" y="1999050"/>
+            <a:ext cx="3547919" cy="572700"/>
+          </a:xfrm>
+        </p:spPr>
+        <p:txBody>
+          <a:bodyPr/>
+          <a:lstStyle/>
+          <a:p>
+            <a:r>
+              <a:rPr lang="en-CA" sz="5200" dirty="0"/>
+              <a:t>Conclusion</a:t>
+            </a:r>
+          </a:p>
+        </p:txBody>
+      </p:sp>
+    </p:spTree>
+    <p:extLst>
+      <p:ext uri="{BB962C8B-B14F-4D97-AF65-F5344CB8AC3E}">
+        <p14:creationId xmlns:p14="http://schemas.microsoft.com/office/powerpoint/2010/main" val="1561827995"/>
+      </p:ext>
+    </p:extLst>
+  </p:cSld>
+  <p:clrMapOvr>
+    <a:masterClrMapping/>
+  </p:clrMapOvr>
+  <p:transition spd="slow" advTm="5000">
+    <p:push dir="u"/>
+  </p:transition>
+</p:sld>
+</file>
+
+<file path=ppt/slides/slide26.xml><?xml version="1.0" encoding="utf-8"?>
+<p:sld xmlns:a="http://schemas.openxmlformats.org/drawingml/2006/main" xmlns:r="http://schemas.openxmlformats.org/officeDocument/2006/relationships" xmlns:p="http://schemas.openxmlformats.org/presentationml/2006/main">
+  <p:cSld>
+    <p:spTree>
+      <p:nvGrpSpPr>
+        <p:cNvPr id="1" name=""/>
+        <p:cNvGrpSpPr/>
+        <p:nvPr/>
+      </p:nvGrpSpPr>
+      <p:grpSpPr>
+        <a:xfrm>
+          <a:off x="0" y="0"/>
+          <a:ext cx="0" cy="0"/>
+          <a:chOff x="0" y="0"/>
+          <a:chExt cx="0" cy="0"/>
+        </a:xfrm>
+      </p:grpSpPr>
+      <p:sp>
+        <p:nvSpPr>
+          <p:cNvPr id="2" name="Title 1">
+            <a:extLst>
+              <a:ext uri="{FF2B5EF4-FFF2-40B4-BE49-F238E27FC236}">
+                <a16:creationId xmlns:a16="http://schemas.microsoft.com/office/drawing/2014/main" id="{FC29A51E-5DF1-4327-BB8D-11E95733548B}"/>
+              </a:ext>
+            </a:extLst>
+          </p:cNvPr>
+          <p:cNvSpPr>
+            <a:spLocks noGrp="1"/>
+          </p:cNvSpPr>
+          <p:nvPr>
+            <p:ph type="title"/>
+          </p:nvPr>
+        </p:nvSpPr>
+        <p:spPr/>
+        <p:txBody>
+          <a:bodyPr/>
+          <a:lstStyle/>
+          <a:p>
+            <a:endParaRPr lang="en-CA"/>
+          </a:p>
+        </p:txBody>
+      </p:sp>
+      <p:sp>
+        <p:nvSpPr>
+          <p:cNvPr id="3" name="Content Placeholder 2">
+            <a:extLst>
+              <a:ext uri="{FF2B5EF4-FFF2-40B4-BE49-F238E27FC236}">
+                <a16:creationId xmlns:a16="http://schemas.microsoft.com/office/drawing/2014/main" id="{BE4FDFFF-2903-4733-B78D-5C6A206AACD1}"/>
+              </a:ext>
+            </a:extLst>
+          </p:cNvPr>
+          <p:cNvSpPr>
+            <a:spLocks noGrp="1"/>
+          </p:cNvSpPr>
+          <p:nvPr>
+            <p:ph idx="1"/>
+          </p:nvPr>
+        </p:nvSpPr>
+        <p:spPr/>
+        <p:txBody>
+          <a:bodyPr/>
+          <a:lstStyle/>
+          <a:p>
+            <a:r>
+              <a:rPr lang="en-CA" dirty="0"/>
+              <a:t>We set out to learn game implementation with our own Connect Four using python and </a:t>
+            </a:r>
+            <a:r>
+              <a:rPr lang="en-CA" dirty="0" err="1"/>
+              <a:t>pygame</a:t>
+            </a:r>
+            <a:r>
+              <a:rPr lang="en-CA" dirty="0"/>
+              <a:t> coding</a:t>
+            </a:r>
+          </a:p>
+          <a:p>
+            <a:endParaRPr lang="en-CA" dirty="0"/>
+          </a:p>
+          <a:p>
+            <a:endParaRPr lang="en-CA" dirty="0"/>
+          </a:p>
+        </p:txBody>
+      </p:sp>
+    </p:spTree>
+    <p:extLst>
+      <p:ext uri="{BB962C8B-B14F-4D97-AF65-F5344CB8AC3E}">
+        <p14:creationId xmlns:p14="http://schemas.microsoft.com/office/powerpoint/2010/main" val="760073789"/>
+      </p:ext>
+    </p:extLst>
+  </p:cSld>
+  <p:clrMapOvr>
+    <a:masterClrMapping/>
+  </p:clrMapOvr>
+  <p:transition spd="slow" advTm="20000">
+    <p:push dir="u"/>
+  </p:transition>
 </p:sld>
 </file>
 
@@ -8962,8 +9290,8 @@
         </p:nvSpPr>
         <p:spPr>
           <a:xfrm>
-            <a:off x="311700" y="288275"/>
-            <a:ext cx="8520600" cy="572700"/>
+            <a:off x="2447166" y="1797177"/>
+            <a:ext cx="4249667" cy="572700"/>
           </a:xfrm>
           <a:prstGeom prst="rect">
             <a:avLst/>
@@ -8985,10 +9313,10 @@
               <a:buNone/>
             </a:pPr>
             <a:r>
-              <a:rPr lang="en" sz="3200" dirty="0"/>
+              <a:rPr lang="en" sz="5200" dirty="0"/>
               <a:t>Our Incentive</a:t>
             </a:r>
-            <a:endParaRPr sz="3200" dirty="0"/>
+            <a:endParaRPr sz="5200" dirty="0"/>
           </a:p>
         </p:txBody>
       </p:sp>
@@ -9004,8 +9332,8 @@
         </p:nvSpPr>
         <p:spPr>
           <a:xfrm>
-            <a:off x="311700" y="1064448"/>
-            <a:ext cx="8520600" cy="3416400"/>
+            <a:off x="1479673" y="3171023"/>
+            <a:ext cx="5993268" cy="923840"/>
           </a:xfrm>
           <a:prstGeom prst="rect">
             <a:avLst/>
@@ -9059,90 +9387,6 @@
               <a:t>				</a:t>
             </a:r>
             <a:endParaRPr dirty="0"/>
-          </a:p>
-        </p:txBody>
-      </p:sp>
-      <p:pic>
-        <p:nvPicPr>
-          <p:cNvPr id="3" name="Picture 2">
-            <a:extLst>
-              <a:ext uri="{FF2B5EF4-FFF2-40B4-BE49-F238E27FC236}">
-                <a16:creationId xmlns:a16="http://schemas.microsoft.com/office/drawing/2014/main" id="{B3C47E3B-0AB8-4BBE-AAB0-0BD3F2067FBB}"/>
-              </a:ext>
-            </a:extLst>
-          </p:cNvPr>
-          <p:cNvPicPr>
-            <a:picLocks noChangeAspect="1"/>
-          </p:cNvPicPr>
-          <p:nvPr/>
-        </p:nvPicPr>
-        <p:blipFill>
-          <a:blip r:embed="rId3"/>
-          <a:stretch>
-            <a:fillRect/>
-          </a:stretch>
-        </p:blipFill>
-        <p:spPr>
-          <a:xfrm>
-            <a:off x="2674878" y="2058867"/>
-            <a:ext cx="3475265" cy="2492559"/>
-          </a:xfrm>
-          <a:prstGeom prst="rect">
-            <a:avLst/>
-          </a:prstGeom>
-        </p:spPr>
-      </p:pic>
-      <p:sp>
-        <p:nvSpPr>
-          <p:cNvPr id="4" name="Rectangle 3">
-            <a:extLst>
-              <a:ext uri="{FF2B5EF4-FFF2-40B4-BE49-F238E27FC236}">
-                <a16:creationId xmlns:a16="http://schemas.microsoft.com/office/drawing/2014/main" id="{DFCFEEEB-9996-4BE4-889A-2C23AD8F311D}"/>
-              </a:ext>
-            </a:extLst>
-          </p:cNvPr>
-          <p:cNvSpPr/>
-          <p:nvPr/>
-        </p:nvSpPr>
-        <p:spPr>
-          <a:xfrm>
-            <a:off x="2674878" y="2078803"/>
-            <a:ext cx="278440" cy="255181"/>
-          </a:xfrm>
-          <a:prstGeom prst="rect">
-            <a:avLst/>
-          </a:prstGeom>
-          <a:solidFill>
-            <a:schemeClr val="bg1"/>
-          </a:solidFill>
-          <a:ln>
-            <a:solidFill>
-              <a:schemeClr val="bg1"/>
-            </a:solidFill>
-          </a:ln>
-        </p:spPr>
-        <p:style>
-          <a:lnRef idx="2">
-            <a:schemeClr val="accent1">
-              <a:shade val="50000"/>
-            </a:schemeClr>
-          </a:lnRef>
-          <a:fillRef idx="1">
-            <a:schemeClr val="accent1"/>
-          </a:fillRef>
-          <a:effectRef idx="0">
-            <a:schemeClr val="accent1"/>
-          </a:effectRef>
-          <a:fontRef idx="minor">
-            <a:schemeClr val="lt1"/>
-          </a:fontRef>
-        </p:style>
-        <p:txBody>
-          <a:bodyPr rtlCol="0" anchor="ctr"/>
-          <a:lstStyle/>
-          <a:p>
-            <a:pPr algn="ctr"/>
-            <a:endParaRPr lang="en-CA" dirty="0"/>
           </a:p>
         </p:txBody>
       </p:sp>
@@ -9162,381 +9406,6 @@
   <p:cSld>
     <p:spTree>
       <p:nvGrpSpPr>
-        <p:cNvPr id="1" name="Shape 65"/>
-        <p:cNvGrpSpPr/>
-        <p:nvPr/>
-      </p:nvGrpSpPr>
-      <p:grpSpPr>
-        <a:xfrm>
-          <a:off x="0" y="0"/>
-          <a:ext cx="0" cy="0"/>
-          <a:chOff x="0" y="0"/>
-          <a:chExt cx="0" cy="0"/>
-        </a:xfrm>
-      </p:grpSpPr>
-      <p:sp>
-        <p:nvSpPr>
-          <p:cNvPr id="67" name="Google Shape;67;p15"/>
-          <p:cNvSpPr txBox="1">
-            <a:spLocks noGrp="1"/>
-          </p:cNvSpPr>
-          <p:nvPr>
-            <p:ph type="body" idx="1"/>
-          </p:nvPr>
-        </p:nvSpPr>
-        <p:spPr>
-          <a:xfrm>
-            <a:off x="311700" y="376298"/>
-            <a:ext cx="8520600" cy="3416400"/>
-          </a:xfrm>
-          <a:prstGeom prst="rect">
-            <a:avLst/>
-          </a:prstGeom>
-        </p:spPr>
-        <p:txBody>
-          <a:bodyPr spcFirstLastPara="1" wrap="square" lIns="91425" tIns="91425" rIns="91425" bIns="91425" anchor="t" anchorCtr="0">
-            <a:noAutofit/>
-          </a:bodyPr>
-          <a:lstStyle/>
-          <a:p>
-            <a:pPr marL="0" lvl="0" indent="0" algn="l" rtl="0">
-              <a:spcBef>
-                <a:spcPts val="0"/>
-              </a:spcBef>
-              <a:spcAft>
-                <a:spcPts val="1600"/>
-              </a:spcAft>
-              <a:buClr>
-                <a:schemeClr val="dk1"/>
-              </a:buClr>
-              <a:buSzPts val="1100"/>
-              <a:buFont typeface="Arial"/>
-              <a:buNone/>
-            </a:pPr>
-            <a:r>
-              <a:rPr lang="en" sz="2400" dirty="0"/>
-              <a:t>Sure it’s like “re-inventing the wheel”, however, we would learn how to implement it. We gain more insight and a better perspective in coding the game.</a:t>
-            </a:r>
-            <a:endParaRPr sz="2400" dirty="0"/>
-          </a:p>
-        </p:txBody>
-      </p:sp>
-      <p:pic>
-        <p:nvPicPr>
-          <p:cNvPr id="3" name="Picture 2">
-            <a:extLst>
-              <a:ext uri="{FF2B5EF4-FFF2-40B4-BE49-F238E27FC236}">
-                <a16:creationId xmlns:a16="http://schemas.microsoft.com/office/drawing/2014/main" id="{8B4525E3-59B2-454A-9C97-406D56D6247E}"/>
-              </a:ext>
-            </a:extLst>
-          </p:cNvPr>
-          <p:cNvPicPr>
-            <a:picLocks noChangeAspect="1"/>
-          </p:cNvPicPr>
-          <p:nvPr/>
-        </p:nvPicPr>
-        <p:blipFill>
-          <a:blip r:embed="rId3"/>
-          <a:stretch>
-            <a:fillRect/>
-          </a:stretch>
-        </p:blipFill>
-        <p:spPr>
-          <a:xfrm>
-            <a:off x="983512" y="2261610"/>
-            <a:ext cx="2286000" cy="2286000"/>
-          </a:xfrm>
-          <a:prstGeom prst="rect">
-            <a:avLst/>
-          </a:prstGeom>
-        </p:spPr>
-      </p:pic>
-      <p:pic>
-        <p:nvPicPr>
-          <p:cNvPr id="11" name="Picture 10">
-            <a:extLst>
-              <a:ext uri="{FF2B5EF4-FFF2-40B4-BE49-F238E27FC236}">
-                <a16:creationId xmlns:a16="http://schemas.microsoft.com/office/drawing/2014/main" id="{03161CD3-7E7A-4EAB-BD73-A4A6957E89F4}"/>
-              </a:ext>
-            </a:extLst>
-          </p:cNvPr>
-          <p:cNvPicPr>
-            <a:picLocks noChangeAspect="1"/>
-          </p:cNvPicPr>
-          <p:nvPr/>
-        </p:nvPicPr>
-        <p:blipFill>
-          <a:blip r:embed="rId4"/>
-          <a:stretch>
-            <a:fillRect/>
-          </a:stretch>
-        </p:blipFill>
-        <p:spPr>
-          <a:xfrm>
-            <a:off x="4539767" y="2589594"/>
-            <a:ext cx="1420578" cy="1420578"/>
-          </a:xfrm>
-          <a:prstGeom prst="rect">
-            <a:avLst/>
-          </a:prstGeom>
-        </p:spPr>
-      </p:pic>
-      <p:pic>
-        <p:nvPicPr>
-          <p:cNvPr id="13" name="Picture 12">
-            <a:extLst>
-              <a:ext uri="{FF2B5EF4-FFF2-40B4-BE49-F238E27FC236}">
-                <a16:creationId xmlns:a16="http://schemas.microsoft.com/office/drawing/2014/main" id="{033E5EE3-203E-4216-A244-FE54BE78D6A7}"/>
-              </a:ext>
-            </a:extLst>
-          </p:cNvPr>
-          <p:cNvPicPr>
-            <a:picLocks noChangeAspect="1"/>
-          </p:cNvPicPr>
-          <p:nvPr/>
-        </p:nvPicPr>
-        <p:blipFill>
-          <a:blip r:embed="rId5"/>
-          <a:stretch>
-            <a:fillRect/>
-          </a:stretch>
-        </p:blipFill>
-        <p:spPr>
-          <a:xfrm>
-            <a:off x="7118124" y="3290219"/>
-            <a:ext cx="1298036" cy="1298036"/>
-          </a:xfrm>
-          <a:prstGeom prst="rect">
-            <a:avLst/>
-          </a:prstGeom>
-        </p:spPr>
-      </p:pic>
-      <p:pic>
-        <p:nvPicPr>
-          <p:cNvPr id="15" name="Picture 14">
-            <a:extLst>
-              <a:ext uri="{FF2B5EF4-FFF2-40B4-BE49-F238E27FC236}">
-                <a16:creationId xmlns:a16="http://schemas.microsoft.com/office/drawing/2014/main" id="{7273B682-2908-44EE-8D84-8086F3233AC4}"/>
-              </a:ext>
-            </a:extLst>
-          </p:cNvPr>
-          <p:cNvPicPr>
-            <a:picLocks noChangeAspect="1"/>
-          </p:cNvPicPr>
-          <p:nvPr/>
-        </p:nvPicPr>
-        <p:blipFill>
-          <a:blip r:embed="rId6"/>
-          <a:stretch>
-            <a:fillRect/>
-          </a:stretch>
-        </p:blipFill>
-        <p:spPr>
-          <a:xfrm>
-            <a:off x="6062677" y="1526972"/>
-            <a:ext cx="1402080" cy="1402080"/>
-          </a:xfrm>
-          <a:prstGeom prst="rect">
-            <a:avLst/>
-          </a:prstGeom>
-        </p:spPr>
-      </p:pic>
-      <p:sp>
-        <p:nvSpPr>
-          <p:cNvPr id="16" name="Arrow: Bent 15">
-            <a:extLst>
-              <a:ext uri="{FF2B5EF4-FFF2-40B4-BE49-F238E27FC236}">
-                <a16:creationId xmlns:a16="http://schemas.microsoft.com/office/drawing/2014/main" id="{1B7FFBBB-3933-4DC9-85D5-6061B405CC23}"/>
-              </a:ext>
-            </a:extLst>
-          </p:cNvPr>
-          <p:cNvSpPr/>
-          <p:nvPr/>
-        </p:nvSpPr>
-        <p:spPr>
-          <a:xfrm>
-            <a:off x="5018436" y="1974973"/>
-            <a:ext cx="978441" cy="506078"/>
-          </a:xfrm>
-          <a:prstGeom prst="bentArrow">
-            <a:avLst>
-              <a:gd name="adj1" fmla="val 25000"/>
-              <a:gd name="adj2" fmla="val 23950"/>
-              <a:gd name="adj3" fmla="val 25000"/>
-              <a:gd name="adj4" fmla="val 43750"/>
-            </a:avLst>
-          </a:prstGeom>
-          <a:solidFill>
-            <a:schemeClr val="bg1"/>
-          </a:solidFill>
-          <a:ln>
-            <a:solidFill>
-              <a:schemeClr val="tx1"/>
-            </a:solidFill>
-          </a:ln>
-        </p:spPr>
-        <p:style>
-          <a:lnRef idx="2">
-            <a:schemeClr val="accent1">
-              <a:shade val="50000"/>
-            </a:schemeClr>
-          </a:lnRef>
-          <a:fillRef idx="1">
-            <a:schemeClr val="accent1"/>
-          </a:fillRef>
-          <a:effectRef idx="0">
-            <a:schemeClr val="accent1"/>
-          </a:effectRef>
-          <a:fontRef idx="minor">
-            <a:schemeClr val="lt1"/>
-          </a:fontRef>
-        </p:style>
-        <p:txBody>
-          <a:bodyPr rtlCol="0" anchor="ctr"/>
-          <a:lstStyle/>
-          <a:p>
-            <a:pPr algn="ctr"/>
-            <a:endParaRPr lang="en-CA">
-              <a:solidFill>
-                <a:schemeClr val="tx1"/>
-              </a:solidFill>
-            </a:endParaRPr>
-          </a:p>
-        </p:txBody>
-      </p:sp>
-      <p:sp>
-        <p:nvSpPr>
-          <p:cNvPr id="19" name="Arrow: Bent 18">
-            <a:extLst>
-              <a:ext uri="{FF2B5EF4-FFF2-40B4-BE49-F238E27FC236}">
-                <a16:creationId xmlns:a16="http://schemas.microsoft.com/office/drawing/2014/main" id="{1F3974A8-52D3-44D5-A823-6FF0D36983D6}"/>
-              </a:ext>
-            </a:extLst>
-          </p:cNvPr>
-          <p:cNvSpPr/>
-          <p:nvPr/>
-        </p:nvSpPr>
-        <p:spPr>
-          <a:xfrm rot="5400000">
-            <a:off x="7360176" y="2441282"/>
-            <a:ext cx="978441" cy="506078"/>
-          </a:xfrm>
-          <a:prstGeom prst="bentArrow">
-            <a:avLst>
-              <a:gd name="adj1" fmla="val 25000"/>
-              <a:gd name="adj2" fmla="val 25000"/>
-              <a:gd name="adj3" fmla="val 25000"/>
-              <a:gd name="adj4" fmla="val 43750"/>
-            </a:avLst>
-          </a:prstGeom>
-          <a:solidFill>
-            <a:schemeClr val="bg1"/>
-          </a:solidFill>
-          <a:ln>
-            <a:solidFill>
-              <a:schemeClr val="tx1"/>
-            </a:solidFill>
-          </a:ln>
-        </p:spPr>
-        <p:style>
-          <a:lnRef idx="2">
-            <a:schemeClr val="accent1">
-              <a:shade val="50000"/>
-            </a:schemeClr>
-          </a:lnRef>
-          <a:fillRef idx="1">
-            <a:schemeClr val="accent1"/>
-          </a:fillRef>
-          <a:effectRef idx="0">
-            <a:schemeClr val="accent1"/>
-          </a:effectRef>
-          <a:fontRef idx="minor">
-            <a:schemeClr val="lt1"/>
-          </a:fontRef>
-        </p:style>
-        <p:txBody>
-          <a:bodyPr rtlCol="0" anchor="ctr"/>
-          <a:lstStyle/>
-          <a:p>
-            <a:pPr algn="ctr"/>
-            <a:endParaRPr lang="en-CA">
-              <a:solidFill>
-                <a:schemeClr val="tx1"/>
-              </a:solidFill>
-            </a:endParaRPr>
-          </a:p>
-        </p:txBody>
-      </p:sp>
-      <p:sp>
-        <p:nvSpPr>
-          <p:cNvPr id="17" name="Arrow: Right 16">
-            <a:extLst>
-              <a:ext uri="{FF2B5EF4-FFF2-40B4-BE49-F238E27FC236}">
-                <a16:creationId xmlns:a16="http://schemas.microsoft.com/office/drawing/2014/main" id="{010F250C-B4B3-4280-9F4B-5B6F5673AE58}"/>
-              </a:ext>
-            </a:extLst>
-          </p:cNvPr>
-          <p:cNvSpPr/>
-          <p:nvPr/>
-        </p:nvSpPr>
-        <p:spPr>
-          <a:xfrm rot="12340025">
-            <a:off x="6079624" y="3775155"/>
-            <a:ext cx="787116" cy="257562"/>
-          </a:xfrm>
-          <a:prstGeom prst="rightArrow">
-            <a:avLst/>
-          </a:prstGeom>
-          <a:solidFill>
-            <a:schemeClr val="bg1"/>
-          </a:solidFill>
-          <a:ln>
-            <a:solidFill>
-              <a:schemeClr val="tx1"/>
-            </a:solidFill>
-          </a:ln>
-        </p:spPr>
-        <p:style>
-          <a:lnRef idx="2">
-            <a:schemeClr val="accent1">
-              <a:shade val="50000"/>
-            </a:schemeClr>
-          </a:lnRef>
-          <a:fillRef idx="1">
-            <a:schemeClr val="accent1"/>
-          </a:fillRef>
-          <a:effectRef idx="0">
-            <a:schemeClr val="accent1"/>
-          </a:effectRef>
-          <a:fontRef idx="minor">
-            <a:schemeClr val="lt1"/>
-          </a:fontRef>
-        </p:style>
-        <p:txBody>
-          <a:bodyPr rtlCol="0" anchor="ctr"/>
-          <a:lstStyle/>
-          <a:p>
-            <a:pPr algn="ctr"/>
-            <a:endParaRPr lang="en-CA"/>
-          </a:p>
-        </p:txBody>
-      </p:sp>
-    </p:spTree>
-  </p:cSld>
-  <p:clrMapOvr>
-    <a:masterClrMapping/>
-  </p:clrMapOvr>
-  <p:transition spd="slow" advTm="15000">
-    <p:push dir="u"/>
-  </p:transition>
-</p:sld>
-</file>
-
-<file path=ppt/slides/slide5.xml><?xml version="1.0" encoding="utf-8"?>
-<p:sld xmlns:a="http://schemas.openxmlformats.org/drawingml/2006/main" xmlns:r="http://schemas.openxmlformats.org/officeDocument/2006/relationships" xmlns:p="http://schemas.openxmlformats.org/presentationml/2006/main">
-  <p:cSld>
-    <p:spTree>
-      <p:nvGrpSpPr>
         <p:cNvPr id="1" name="Shape 71"/>
         <p:cNvGrpSpPr/>
         <p:nvPr/>
@@ -9562,7 +9431,7 @@
         <p:spPr>
           <a:xfrm>
             <a:off x="311700" y="237182"/>
-            <a:ext cx="8520600" cy="3416400"/>
+            <a:ext cx="8520600" cy="1744812"/>
           </a:xfrm>
           <a:prstGeom prst="rect">
             <a:avLst/>
@@ -9590,7 +9459,7 @@
             </a:pPr>
             <a:r>
               <a:rPr lang="en" sz="2400" dirty="0"/>
-              <a:t>We all know the rules, we played this game as kids. But how do we actually code it out? How do we arrange the visuals and design the </a:t>
+              <a:t>We all know the rules. We played this game as kids, but how do we actually code it out? How do we arrange the visuals and design the </a:t>
             </a:r>
             <a:r>
               <a:rPr lang="en-CA" sz="2400" dirty="0"/>
@@ -9626,7 +9495,7 @@
         </p:blipFill>
         <p:spPr>
           <a:xfrm>
-            <a:off x="3069633" y="2571750"/>
+            <a:off x="3000522" y="2880094"/>
             <a:ext cx="2671949" cy="1933234"/>
           </a:xfrm>
           <a:prstGeom prst="rect">
@@ -9648,7 +9517,7 @@
         </p:nvSpPr>
         <p:spPr>
           <a:xfrm>
-            <a:off x="5858540" y="2571750"/>
+            <a:off x="5789429" y="2880094"/>
             <a:ext cx="1786269" cy="1840762"/>
           </a:xfrm>
           <a:prstGeom prst="rect">
@@ -9694,7 +9563,7 @@
         </p:nvSpPr>
         <p:spPr>
           <a:xfrm>
-            <a:off x="5867155" y="2571750"/>
+            <a:off x="5798044" y="2880094"/>
             <a:ext cx="3023624" cy="1815882"/>
           </a:xfrm>
           <a:prstGeom prst="rect">
@@ -9764,7 +9633,7 @@
         </p:nvCxnSpPr>
         <p:spPr>
           <a:xfrm>
-            <a:off x="2114422" y="3111917"/>
+            <a:off x="2045311" y="3420261"/>
             <a:ext cx="1379893" cy="0"/>
           </a:xfrm>
           <a:prstGeom prst="straightConnector1">
@@ -9806,7 +9675,7 @@
         </p:nvSpPr>
         <p:spPr>
           <a:xfrm>
-            <a:off x="1079384" y="2922169"/>
+            <a:off x="1010273" y="3230513"/>
             <a:ext cx="1488558" cy="307777"/>
           </a:xfrm>
           <a:prstGeom prst="rect">
@@ -9841,7 +9710,7 @@
         </p:nvSpPr>
         <p:spPr>
           <a:xfrm>
-            <a:off x="3611273" y="2996702"/>
+            <a:off x="3542162" y="3305046"/>
             <a:ext cx="223283" cy="230430"/>
           </a:xfrm>
           <a:prstGeom prst="ellipse">
@@ -9897,7 +9766,7 @@
         </p:nvCxnSpPr>
         <p:spPr>
           <a:xfrm flipV="1">
-            <a:off x="2114422" y="4104168"/>
+            <a:off x="2045311" y="4412512"/>
             <a:ext cx="1496851" cy="12184"/>
           </a:xfrm>
           <a:prstGeom prst="straightConnector1">
@@ -9941,7 +9810,7 @@
         </p:nvCxnSpPr>
         <p:spPr>
           <a:xfrm flipV="1">
-            <a:off x="3834556" y="3715591"/>
+            <a:off x="3765445" y="4023935"/>
             <a:ext cx="248346" cy="233067"/>
           </a:xfrm>
           <a:prstGeom prst="straightConnector1">
@@ -9983,7 +9852,7 @@
         </p:nvSpPr>
         <p:spPr>
           <a:xfrm>
-            <a:off x="1033188" y="3770113"/>
+            <a:off x="964077" y="4078457"/>
             <a:ext cx="1408732" cy="523220"/>
           </a:xfrm>
           <a:prstGeom prst="rect">
@@ -10018,7 +9887,7 @@
         </p:nvCxnSpPr>
         <p:spPr>
           <a:xfrm>
-            <a:off x="4082902" y="2126512"/>
+            <a:off x="4013791" y="2441150"/>
             <a:ext cx="0" cy="340241"/>
           </a:xfrm>
           <a:prstGeom prst="straightConnector1">
@@ -10060,7 +9929,7 @@
         </p:nvSpPr>
         <p:spPr>
           <a:xfrm>
-            <a:off x="4082902" y="2019987"/>
+            <a:off x="4082902" y="2349661"/>
             <a:ext cx="1169582" cy="523220"/>
           </a:xfrm>
           <a:prstGeom prst="rect">
@@ -10095,7 +9964,7 @@
         </p:nvSpPr>
         <p:spPr>
           <a:xfrm>
-            <a:off x="6028890" y="3423152"/>
+            <a:off x="5959779" y="3731496"/>
             <a:ext cx="223282" cy="230430"/>
           </a:xfrm>
           <a:prstGeom prst="ellipse">
@@ -10149,7 +10018,7 @@
         </p:nvSpPr>
         <p:spPr>
           <a:xfrm>
-            <a:off x="6028890" y="3720340"/>
+            <a:off x="5959779" y="4028684"/>
             <a:ext cx="223283" cy="230430"/>
           </a:xfrm>
           <a:prstGeom prst="ellipse">
@@ -10203,7 +10072,7 @@
         </p:nvSpPr>
         <p:spPr>
           <a:xfrm>
-            <a:off x="1245617" y="2495719"/>
+            <a:off x="1176506" y="2804063"/>
             <a:ext cx="1591315" cy="307777"/>
           </a:xfrm>
           <a:prstGeom prst="rect">
@@ -10265,6 +10134,389 @@
     <a:masterClrMapping/>
   </p:clrMapOvr>
   <p:transition spd="slow" advTm="20000">
+    <p:push dir="u"/>
+  </p:transition>
+</p:sld>
+</file>
+
+<file path=ppt/slides/slide5.xml><?xml version="1.0" encoding="utf-8"?>
+<p:sld xmlns:a="http://schemas.openxmlformats.org/drawingml/2006/main" xmlns:r="http://schemas.openxmlformats.org/officeDocument/2006/relationships" xmlns:p="http://schemas.openxmlformats.org/presentationml/2006/main">
+  <p:cSld>
+    <p:spTree>
+      <p:nvGrpSpPr>
+        <p:cNvPr id="1" name="Shape 65"/>
+        <p:cNvGrpSpPr/>
+        <p:nvPr/>
+      </p:nvGrpSpPr>
+      <p:grpSpPr>
+        <a:xfrm>
+          <a:off x="0" y="0"/>
+          <a:ext cx="0" cy="0"/>
+          <a:chOff x="0" y="0"/>
+          <a:chExt cx="0" cy="0"/>
+        </a:xfrm>
+      </p:grpSpPr>
+      <p:sp>
+        <p:nvSpPr>
+          <p:cNvPr id="67" name="Google Shape;67;p15"/>
+          <p:cNvSpPr txBox="1">
+            <a:spLocks noGrp="1"/>
+          </p:cNvSpPr>
+          <p:nvPr>
+            <p:ph type="body" idx="1"/>
+          </p:nvPr>
+        </p:nvSpPr>
+        <p:spPr>
+          <a:xfrm>
+            <a:off x="311700" y="376298"/>
+            <a:ext cx="8520600" cy="3416400"/>
+          </a:xfrm>
+          <a:prstGeom prst="rect">
+            <a:avLst/>
+          </a:prstGeom>
+        </p:spPr>
+        <p:txBody>
+          <a:bodyPr spcFirstLastPara="1" wrap="square" lIns="91425" tIns="91425" rIns="91425" bIns="91425" anchor="t" anchorCtr="0">
+            <a:noAutofit/>
+          </a:bodyPr>
+          <a:lstStyle/>
+          <a:p>
+            <a:pPr marL="0" lvl="0" indent="0" algn="l" rtl="0">
+              <a:spcBef>
+                <a:spcPts val="0"/>
+              </a:spcBef>
+              <a:spcAft>
+                <a:spcPts val="1600"/>
+              </a:spcAft>
+              <a:buClr>
+                <a:schemeClr val="dk1"/>
+              </a:buClr>
+              <a:buSzPts val="1100"/>
+              <a:buFont typeface="Arial"/>
+              <a:buNone/>
+            </a:pPr>
+            <a:r>
+              <a:rPr lang="en-CA" sz="2400" dirty="0"/>
+              <a:t>There have been many interpretations of Connect Four. </a:t>
+            </a:r>
+            <a:r>
+              <a:rPr lang="en" sz="2400" dirty="0"/>
+              <a:t>We </a:t>
+            </a:r>
+            <a:r>
+              <a:rPr lang="en-CA" sz="2400" dirty="0"/>
+              <a:t>made our game to be simplest version to keep within scope. So, its not going to be anything new.</a:t>
+            </a:r>
+            <a:endParaRPr sz="2400" dirty="0"/>
+          </a:p>
+        </p:txBody>
+      </p:sp>
+      <p:pic>
+        <p:nvPicPr>
+          <p:cNvPr id="3" name="Picture 2">
+            <a:extLst>
+              <a:ext uri="{FF2B5EF4-FFF2-40B4-BE49-F238E27FC236}">
+                <a16:creationId xmlns:a16="http://schemas.microsoft.com/office/drawing/2014/main" id="{8B4525E3-59B2-454A-9C97-406D56D6247E}"/>
+              </a:ext>
+            </a:extLst>
+          </p:cNvPr>
+          <p:cNvPicPr>
+            <a:picLocks noChangeAspect="1"/>
+          </p:cNvPicPr>
+          <p:nvPr/>
+        </p:nvPicPr>
+        <p:blipFill>
+          <a:blip r:embed="rId3"/>
+          <a:stretch>
+            <a:fillRect/>
+          </a:stretch>
+        </p:blipFill>
+        <p:spPr>
+          <a:xfrm>
+            <a:off x="983512" y="2261610"/>
+            <a:ext cx="2286000" cy="2286000"/>
+          </a:xfrm>
+          <a:prstGeom prst="rect">
+            <a:avLst/>
+          </a:prstGeom>
+        </p:spPr>
+      </p:pic>
+      <p:pic>
+        <p:nvPicPr>
+          <p:cNvPr id="11" name="Picture 10">
+            <a:extLst>
+              <a:ext uri="{FF2B5EF4-FFF2-40B4-BE49-F238E27FC236}">
+                <a16:creationId xmlns:a16="http://schemas.microsoft.com/office/drawing/2014/main" id="{03161CD3-7E7A-4EAB-BD73-A4A6957E89F4}"/>
+              </a:ext>
+            </a:extLst>
+          </p:cNvPr>
+          <p:cNvPicPr>
+            <a:picLocks noChangeAspect="1"/>
+          </p:cNvPicPr>
+          <p:nvPr/>
+        </p:nvPicPr>
+        <p:blipFill>
+          <a:blip r:embed="rId4"/>
+          <a:stretch>
+            <a:fillRect/>
+          </a:stretch>
+        </p:blipFill>
+        <p:spPr>
+          <a:xfrm>
+            <a:off x="4539767" y="2589594"/>
+            <a:ext cx="1420578" cy="1420578"/>
+          </a:xfrm>
+          <a:prstGeom prst="rect">
+            <a:avLst/>
+          </a:prstGeom>
+        </p:spPr>
+      </p:pic>
+      <p:pic>
+        <p:nvPicPr>
+          <p:cNvPr id="13" name="Picture 12">
+            <a:extLst>
+              <a:ext uri="{FF2B5EF4-FFF2-40B4-BE49-F238E27FC236}">
+                <a16:creationId xmlns:a16="http://schemas.microsoft.com/office/drawing/2014/main" id="{033E5EE3-203E-4216-A244-FE54BE78D6A7}"/>
+              </a:ext>
+            </a:extLst>
+          </p:cNvPr>
+          <p:cNvPicPr>
+            <a:picLocks noChangeAspect="1"/>
+          </p:cNvPicPr>
+          <p:nvPr/>
+        </p:nvPicPr>
+        <p:blipFill>
+          <a:blip r:embed="rId5"/>
+          <a:stretch>
+            <a:fillRect/>
+          </a:stretch>
+        </p:blipFill>
+        <p:spPr>
+          <a:xfrm>
+            <a:off x="7118124" y="3290219"/>
+            <a:ext cx="1298036" cy="1298036"/>
+          </a:xfrm>
+          <a:prstGeom prst="rect">
+            <a:avLst/>
+          </a:prstGeom>
+        </p:spPr>
+      </p:pic>
+      <p:pic>
+        <p:nvPicPr>
+          <p:cNvPr id="15" name="Picture 14">
+            <a:extLst>
+              <a:ext uri="{FF2B5EF4-FFF2-40B4-BE49-F238E27FC236}">
+                <a16:creationId xmlns:a16="http://schemas.microsoft.com/office/drawing/2014/main" id="{7273B682-2908-44EE-8D84-8086F3233AC4}"/>
+              </a:ext>
+            </a:extLst>
+          </p:cNvPr>
+          <p:cNvPicPr>
+            <a:picLocks noChangeAspect="1"/>
+          </p:cNvPicPr>
+          <p:nvPr/>
+        </p:nvPicPr>
+        <p:blipFill>
+          <a:blip r:embed="rId6"/>
+          <a:stretch>
+            <a:fillRect/>
+          </a:stretch>
+        </p:blipFill>
+        <p:spPr>
+          <a:xfrm>
+            <a:off x="6062677" y="1526972"/>
+            <a:ext cx="1402080" cy="1402080"/>
+          </a:xfrm>
+          <a:prstGeom prst="rect">
+            <a:avLst/>
+          </a:prstGeom>
+        </p:spPr>
+      </p:pic>
+      <p:sp>
+        <p:nvSpPr>
+          <p:cNvPr id="16" name="Arrow: Bent 15">
+            <a:extLst>
+              <a:ext uri="{FF2B5EF4-FFF2-40B4-BE49-F238E27FC236}">
+                <a16:creationId xmlns:a16="http://schemas.microsoft.com/office/drawing/2014/main" id="{1B7FFBBB-3933-4DC9-85D5-6061B405CC23}"/>
+              </a:ext>
+            </a:extLst>
+          </p:cNvPr>
+          <p:cNvSpPr/>
+          <p:nvPr/>
+        </p:nvSpPr>
+        <p:spPr>
+          <a:xfrm>
+            <a:off x="5018436" y="1974973"/>
+            <a:ext cx="978441" cy="506078"/>
+          </a:xfrm>
+          <a:prstGeom prst="bentArrow">
+            <a:avLst>
+              <a:gd name="adj1" fmla="val 25000"/>
+              <a:gd name="adj2" fmla="val 23950"/>
+              <a:gd name="adj3" fmla="val 25000"/>
+              <a:gd name="adj4" fmla="val 43750"/>
+            </a:avLst>
+          </a:prstGeom>
+          <a:solidFill>
+            <a:schemeClr val="bg1"/>
+          </a:solidFill>
+          <a:ln>
+            <a:solidFill>
+              <a:schemeClr val="tx1"/>
+            </a:solidFill>
+          </a:ln>
+        </p:spPr>
+        <p:style>
+          <a:lnRef idx="2">
+            <a:schemeClr val="accent1">
+              <a:shade val="50000"/>
+            </a:schemeClr>
+          </a:lnRef>
+          <a:fillRef idx="1">
+            <a:schemeClr val="accent1"/>
+          </a:fillRef>
+          <a:effectRef idx="0">
+            <a:schemeClr val="accent1"/>
+          </a:effectRef>
+          <a:fontRef idx="minor">
+            <a:schemeClr val="lt1"/>
+          </a:fontRef>
+        </p:style>
+        <p:txBody>
+          <a:bodyPr rtlCol="0" anchor="ctr"/>
+          <a:lstStyle/>
+          <a:p>
+            <a:pPr algn="ctr"/>
+            <a:endParaRPr lang="en-CA">
+              <a:solidFill>
+                <a:schemeClr val="tx1"/>
+              </a:solidFill>
+            </a:endParaRPr>
+          </a:p>
+        </p:txBody>
+      </p:sp>
+      <p:sp>
+        <p:nvSpPr>
+          <p:cNvPr id="19" name="Arrow: Bent 18">
+            <a:extLst>
+              <a:ext uri="{FF2B5EF4-FFF2-40B4-BE49-F238E27FC236}">
+                <a16:creationId xmlns:a16="http://schemas.microsoft.com/office/drawing/2014/main" id="{1F3974A8-52D3-44D5-A823-6FF0D36983D6}"/>
+              </a:ext>
+            </a:extLst>
+          </p:cNvPr>
+          <p:cNvSpPr/>
+          <p:nvPr/>
+        </p:nvSpPr>
+        <p:spPr>
+          <a:xfrm rot="5400000">
+            <a:off x="7360176" y="2441282"/>
+            <a:ext cx="978441" cy="506078"/>
+          </a:xfrm>
+          <a:prstGeom prst="bentArrow">
+            <a:avLst>
+              <a:gd name="adj1" fmla="val 25000"/>
+              <a:gd name="adj2" fmla="val 25000"/>
+              <a:gd name="adj3" fmla="val 25000"/>
+              <a:gd name="adj4" fmla="val 43750"/>
+            </a:avLst>
+          </a:prstGeom>
+          <a:solidFill>
+            <a:schemeClr val="bg1"/>
+          </a:solidFill>
+          <a:ln>
+            <a:solidFill>
+              <a:schemeClr val="tx1"/>
+            </a:solidFill>
+          </a:ln>
+        </p:spPr>
+        <p:style>
+          <a:lnRef idx="2">
+            <a:schemeClr val="accent1">
+              <a:shade val="50000"/>
+            </a:schemeClr>
+          </a:lnRef>
+          <a:fillRef idx="1">
+            <a:schemeClr val="accent1"/>
+          </a:fillRef>
+          <a:effectRef idx="0">
+            <a:schemeClr val="accent1"/>
+          </a:effectRef>
+          <a:fontRef idx="minor">
+            <a:schemeClr val="lt1"/>
+          </a:fontRef>
+        </p:style>
+        <p:txBody>
+          <a:bodyPr rtlCol="0" anchor="ctr"/>
+          <a:lstStyle/>
+          <a:p>
+            <a:pPr algn="ctr"/>
+            <a:endParaRPr lang="en-CA">
+              <a:solidFill>
+                <a:schemeClr val="tx1"/>
+              </a:solidFill>
+            </a:endParaRPr>
+          </a:p>
+        </p:txBody>
+      </p:sp>
+      <p:sp>
+        <p:nvSpPr>
+          <p:cNvPr id="17" name="Arrow: Right 16">
+            <a:extLst>
+              <a:ext uri="{FF2B5EF4-FFF2-40B4-BE49-F238E27FC236}">
+                <a16:creationId xmlns:a16="http://schemas.microsoft.com/office/drawing/2014/main" id="{010F250C-B4B3-4280-9F4B-5B6F5673AE58}"/>
+              </a:ext>
+            </a:extLst>
+          </p:cNvPr>
+          <p:cNvSpPr/>
+          <p:nvPr/>
+        </p:nvSpPr>
+        <p:spPr>
+          <a:xfrm rot="12340025">
+            <a:off x="6079624" y="3775155"/>
+            <a:ext cx="787116" cy="257562"/>
+          </a:xfrm>
+          <a:prstGeom prst="rightArrow">
+            <a:avLst/>
+          </a:prstGeom>
+          <a:solidFill>
+            <a:schemeClr val="bg1"/>
+          </a:solidFill>
+          <a:ln>
+            <a:solidFill>
+              <a:schemeClr val="tx1"/>
+            </a:solidFill>
+          </a:ln>
+        </p:spPr>
+        <p:style>
+          <a:lnRef idx="2">
+            <a:schemeClr val="accent1">
+              <a:shade val="50000"/>
+            </a:schemeClr>
+          </a:lnRef>
+          <a:fillRef idx="1">
+            <a:schemeClr val="accent1"/>
+          </a:fillRef>
+          <a:effectRef idx="0">
+            <a:schemeClr val="accent1"/>
+          </a:effectRef>
+          <a:fontRef idx="minor">
+            <a:schemeClr val="lt1"/>
+          </a:fontRef>
+        </p:style>
+        <p:txBody>
+          <a:bodyPr rtlCol="0" anchor="ctr"/>
+          <a:lstStyle/>
+          <a:p>
+            <a:pPr algn="ctr"/>
+            <a:endParaRPr lang="en-CA"/>
+          </a:p>
+        </p:txBody>
+      </p:sp>
+    </p:spTree>
+  </p:cSld>
+  <p:clrMapOvr>
+    <a:masterClrMapping/>
+  </p:clrMapOvr>
+  <p:transition spd="slow" advTm="15000">
     <p:push dir="u"/>
   </p:transition>
 </p:sld>
@@ -10527,7 +10779,7 @@
         </p:nvSpPr>
         <p:spPr>
           <a:xfrm>
-            <a:off x="311700" y="200476"/>
+            <a:off x="1144396" y="1731907"/>
             <a:ext cx="8520600" cy="572700"/>
           </a:xfrm>
         </p:spPr>
@@ -10536,8 +10788,8 @@
           <a:lstStyle/>
           <a:p>
             <a:r>
-              <a:rPr lang="en-CA" sz="3200" dirty="0"/>
-              <a:t>Our Code Design</a:t>
+              <a:rPr lang="en-CA" sz="5200" dirty="0"/>
+              <a:t>Code Design Process</a:t>
             </a:r>
           </a:p>
         </p:txBody>
@@ -10560,8 +10812,8 @@
         </p:nvSpPr>
         <p:spPr>
           <a:xfrm>
-            <a:off x="187748" y="1108099"/>
-            <a:ext cx="8768504" cy="3416400"/>
+            <a:off x="575381" y="3157871"/>
+            <a:ext cx="7993237" cy="1685606"/>
           </a:xfrm>
         </p:spPr>
         <p:txBody>
@@ -10573,7 +10825,7 @@
             </a:pPr>
             <a:r>
               <a:rPr lang="en-CA" sz="2400" dirty="0"/>
-              <a:t>Our code design had a massive overhaul compared to our previous code design in our last presentation. </a:t>
+              <a:t>Our code design has had a massive overhaul compared to the code design in our previous presentation. </a:t>
             </a:r>
           </a:p>
           <a:p>
@@ -11538,7 +11790,7 @@
         </p:nvSpPr>
         <p:spPr>
           <a:xfrm>
-            <a:off x="311700" y="374453"/>
+            <a:off x="311700" y="863550"/>
             <a:ext cx="8520600" cy="3416400"/>
           </a:xfrm>
         </p:spPr>
@@ -11602,14 +11854,9 @@
   <p:clrMapOvr>
     <a:masterClrMapping/>
   </p:clrMapOvr>
-  <mc:AlternateContent xmlns:mc="http://schemas.openxmlformats.org/markup-compatibility/2006" xmlns:p14="http://schemas.microsoft.com/office/powerpoint/2010/main">
-    <mc:Choice Requires="p14">
-      <p:transition spd="slow" p14:dur="2000" advTm="20000"/>
-    </mc:Choice>
-    <mc:Fallback xmlns="">
-      <p:transition spd="slow" advTm="20000"/>
-    </mc:Fallback>
-  </mc:AlternateContent>
+  <p:transition spd="slow" advTm="20000">
+    <p:push dir="u"/>
+  </p:transition>
 </p:sld>
 </file>
 

</xml_diff>